<commit_message>
Powerpoint with graph annotations and explanations
</commit_message>
<xml_diff>
--- a/data-stories/uber-nyc/UBER Presentation.pptx
+++ b/data-stories/uber-nyc/UBER Presentation.pptx
@@ -5,7 +5,7 @@
     <p:sldMasterId id="2147483648" r:id="rId1"/>
   </p:sldMasterIdLst>
   <p:notesMasterIdLst>
-    <p:notesMasterId r:id="rId20"/>
+    <p:notesMasterId r:id="rId22"/>
   </p:notesMasterIdLst>
   <p:sldIdLst>
     <p:sldId id="259" r:id="rId2"/>
@@ -14,18 +14,20 @@
     <p:sldId id="278" r:id="rId5"/>
     <p:sldId id="257" r:id="rId6"/>
     <p:sldId id="274" r:id="rId7"/>
-    <p:sldId id="283" r:id="rId8"/>
-    <p:sldId id="269" r:id="rId9"/>
-    <p:sldId id="275" r:id="rId10"/>
-    <p:sldId id="279" r:id="rId11"/>
-    <p:sldId id="273" r:id="rId12"/>
-    <p:sldId id="280" r:id="rId13"/>
-    <p:sldId id="281" r:id="rId14"/>
-    <p:sldId id="265" r:id="rId15"/>
-    <p:sldId id="271" r:id="rId16"/>
-    <p:sldId id="272" r:id="rId17"/>
-    <p:sldId id="276" r:id="rId18"/>
-    <p:sldId id="277" r:id="rId19"/>
+    <p:sldId id="269" r:id="rId8"/>
+    <p:sldId id="275" r:id="rId9"/>
+    <p:sldId id="279" r:id="rId10"/>
+    <p:sldId id="284" r:id="rId11"/>
+    <p:sldId id="283" r:id="rId12"/>
+    <p:sldId id="285" r:id="rId13"/>
+    <p:sldId id="273" r:id="rId14"/>
+    <p:sldId id="280" r:id="rId15"/>
+    <p:sldId id="281" r:id="rId16"/>
+    <p:sldId id="265" r:id="rId17"/>
+    <p:sldId id="271" r:id="rId18"/>
+    <p:sldId id="272" r:id="rId19"/>
+    <p:sldId id="276" r:id="rId20"/>
+    <p:sldId id="277" r:id="rId21"/>
   </p:sldIdLst>
   <p:sldSz cx="12192000" cy="6858000"/>
   <p:notesSz cx="6858000" cy="9144000"/>
@@ -662,7 +664,7 @@
           <a:p>
             <a:fld id="{F1403DF4-FF6B-E849-AB5B-E7CD2E3C2037}" type="slidenum">
               <a:rPr lang="en-US" smtClean="0"/>
-              <a:t>12</a:t>
+              <a:t>11</a:t>
             </a:fld>
             <a:endParaRPr lang="en-US"/>
           </a:p>
@@ -671,7 +673,7 @@
     </p:spTree>
     <p:extLst>
       <p:ext uri="{BB962C8B-B14F-4D97-AF65-F5344CB8AC3E}">
-        <p14:creationId xmlns:p14="http://schemas.microsoft.com/office/powerpoint/2010/main" val="138580593"/>
+        <p14:creationId xmlns:p14="http://schemas.microsoft.com/office/powerpoint/2010/main" val="1540726849"/>
       </p:ext>
     </p:extLst>
   </p:cSld>
@@ -746,7 +748,7 @@
           <a:p>
             <a:fld id="{F1403DF4-FF6B-E849-AB5B-E7CD2E3C2037}" type="slidenum">
               <a:rPr lang="en-US" smtClean="0"/>
-              <a:t>13</a:t>
+              <a:t>12</a:t>
             </a:fld>
             <a:endParaRPr lang="en-US"/>
           </a:p>
@@ -755,7 +757,7 @@
     </p:spTree>
     <p:extLst>
       <p:ext uri="{BB962C8B-B14F-4D97-AF65-F5344CB8AC3E}">
-        <p14:creationId xmlns:p14="http://schemas.microsoft.com/office/powerpoint/2010/main" val="950568583"/>
+        <p14:creationId xmlns:p14="http://schemas.microsoft.com/office/powerpoint/2010/main" val="873491692"/>
       </p:ext>
     </p:extLst>
   </p:cSld>
@@ -839,7 +841,7 @@
     </p:spTree>
     <p:extLst>
       <p:ext uri="{BB962C8B-B14F-4D97-AF65-F5344CB8AC3E}">
-        <p14:creationId xmlns:p14="http://schemas.microsoft.com/office/powerpoint/2010/main" val="1551103245"/>
+        <p14:creationId xmlns:p14="http://schemas.microsoft.com/office/powerpoint/2010/main" val="138580593"/>
       </p:ext>
     </p:extLst>
   </p:cSld>
@@ -923,7 +925,7 @@
     </p:spTree>
     <p:extLst>
       <p:ext uri="{BB962C8B-B14F-4D97-AF65-F5344CB8AC3E}">
-        <p14:creationId xmlns:p14="http://schemas.microsoft.com/office/powerpoint/2010/main" val="1663589889"/>
+        <p14:creationId xmlns:p14="http://schemas.microsoft.com/office/powerpoint/2010/main" val="950568583"/>
       </p:ext>
     </p:extLst>
   </p:cSld>
@@ -1007,7 +1009,7 @@
     </p:spTree>
     <p:extLst>
       <p:ext uri="{BB962C8B-B14F-4D97-AF65-F5344CB8AC3E}">
-        <p14:creationId xmlns:p14="http://schemas.microsoft.com/office/powerpoint/2010/main" val="243223712"/>
+        <p14:creationId xmlns:p14="http://schemas.microsoft.com/office/powerpoint/2010/main" val="1551103245"/>
       </p:ext>
     </p:extLst>
   </p:cSld>
@@ -1061,7 +1063,99 @@
           <a:bodyPr/>
           <a:lstStyle/>
           <a:p>
-            <a:endParaRPr lang="en-US" baseline="0" dirty="0"/>
+            <a:r>
+              <a:rPr lang="en-US" dirty="0" smtClean="0"/>
+              <a:t>Is September</a:t>
+            </a:r>
+            <a:r>
+              <a:rPr lang="en-US" baseline="0" dirty="0" smtClean="0"/>
+              <a:t> an exception?</a:t>
+            </a:r>
+            <a:endParaRPr lang="en-US" dirty="0"/>
+          </a:p>
+        </p:txBody>
+      </p:sp>
+      <p:sp>
+        <p:nvSpPr>
+          <p:cNvPr id="4" name="Slide Number Placeholder 3"/>
+          <p:cNvSpPr>
+            <a:spLocks noGrp="1"/>
+          </p:cNvSpPr>
+          <p:nvPr>
+            <p:ph type="sldNum" sz="quarter" idx="10"/>
+          </p:nvPr>
+        </p:nvSpPr>
+        <p:spPr/>
+        <p:txBody>
+          <a:bodyPr/>
+          <a:lstStyle/>
+          <a:p>
+            <a:fld id="{F1403DF4-FF6B-E849-AB5B-E7CD2E3C2037}" type="slidenum">
+              <a:rPr lang="en-US" smtClean="0"/>
+              <a:t>17</a:t>
+            </a:fld>
+            <a:endParaRPr lang="en-US"/>
+          </a:p>
+        </p:txBody>
+      </p:sp>
+    </p:spTree>
+    <p:extLst>
+      <p:ext uri="{BB962C8B-B14F-4D97-AF65-F5344CB8AC3E}">
+        <p14:creationId xmlns:p14="http://schemas.microsoft.com/office/powerpoint/2010/main" val="1663589889"/>
+      </p:ext>
+    </p:extLst>
+  </p:cSld>
+  <p:clrMapOvr>
+    <a:masterClrMapping/>
+  </p:clrMapOvr>
+</p:notes>
+</file>
+
+<file path=ppt/notesSlides/notesSlide16.xml><?xml version="1.0" encoding="utf-8"?>
+<p:notes xmlns:a="http://schemas.openxmlformats.org/drawingml/2006/main" xmlns:r="http://schemas.openxmlformats.org/officeDocument/2006/relationships" xmlns:p="http://schemas.openxmlformats.org/presentationml/2006/main">
+  <p:cSld>
+    <p:spTree>
+      <p:nvGrpSpPr>
+        <p:cNvPr id="1" name=""/>
+        <p:cNvGrpSpPr/>
+        <p:nvPr/>
+      </p:nvGrpSpPr>
+      <p:grpSpPr>
+        <a:xfrm>
+          <a:off x="0" y="0"/>
+          <a:ext cx="0" cy="0"/>
+          <a:chOff x="0" y="0"/>
+          <a:chExt cx="0" cy="0"/>
+        </a:xfrm>
+      </p:grpSpPr>
+      <p:sp>
+        <p:nvSpPr>
+          <p:cNvPr id="2" name="Slide Image Placeholder 1"/>
+          <p:cNvSpPr>
+            <a:spLocks noGrp="1" noRot="1" noChangeAspect="1"/>
+          </p:cNvSpPr>
+          <p:nvPr>
+            <p:ph type="sldImg"/>
+          </p:nvPr>
+        </p:nvSpPr>
+        <p:spPr/>
+      </p:sp>
+      <p:sp>
+        <p:nvSpPr>
+          <p:cNvPr id="3" name="Notes Placeholder 2"/>
+          <p:cNvSpPr>
+            <a:spLocks noGrp="1"/>
+          </p:cNvSpPr>
+          <p:nvPr>
+            <p:ph type="body" idx="1"/>
+          </p:nvPr>
+        </p:nvSpPr>
+        <p:spPr/>
+        <p:txBody>
+          <a:bodyPr/>
+          <a:lstStyle/>
+          <a:p>
+            <a:endParaRPr lang="en-US" dirty="0"/>
           </a:p>
         </p:txBody>
       </p:sp>
@@ -1083,6 +1177,90 @@
             <a:fld id="{F1403DF4-FF6B-E849-AB5B-E7CD2E3C2037}" type="slidenum">
               <a:rPr lang="en-US" smtClean="0"/>
               <a:t>18</a:t>
+            </a:fld>
+            <a:endParaRPr lang="en-US"/>
+          </a:p>
+        </p:txBody>
+      </p:sp>
+    </p:spTree>
+    <p:extLst>
+      <p:ext uri="{BB962C8B-B14F-4D97-AF65-F5344CB8AC3E}">
+        <p14:creationId xmlns:p14="http://schemas.microsoft.com/office/powerpoint/2010/main" val="243223712"/>
+      </p:ext>
+    </p:extLst>
+  </p:cSld>
+  <p:clrMapOvr>
+    <a:masterClrMapping/>
+  </p:clrMapOvr>
+</p:notes>
+</file>
+
+<file path=ppt/notesSlides/notesSlide17.xml><?xml version="1.0" encoding="utf-8"?>
+<p:notes xmlns:a="http://schemas.openxmlformats.org/drawingml/2006/main" xmlns:r="http://schemas.openxmlformats.org/officeDocument/2006/relationships" xmlns:p="http://schemas.openxmlformats.org/presentationml/2006/main">
+  <p:cSld>
+    <p:spTree>
+      <p:nvGrpSpPr>
+        <p:cNvPr id="1" name=""/>
+        <p:cNvGrpSpPr/>
+        <p:nvPr/>
+      </p:nvGrpSpPr>
+      <p:grpSpPr>
+        <a:xfrm>
+          <a:off x="0" y="0"/>
+          <a:ext cx="0" cy="0"/>
+          <a:chOff x="0" y="0"/>
+          <a:chExt cx="0" cy="0"/>
+        </a:xfrm>
+      </p:grpSpPr>
+      <p:sp>
+        <p:nvSpPr>
+          <p:cNvPr id="2" name="Slide Image Placeholder 1"/>
+          <p:cNvSpPr>
+            <a:spLocks noGrp="1" noRot="1" noChangeAspect="1"/>
+          </p:cNvSpPr>
+          <p:nvPr>
+            <p:ph type="sldImg"/>
+          </p:nvPr>
+        </p:nvSpPr>
+        <p:spPr/>
+      </p:sp>
+      <p:sp>
+        <p:nvSpPr>
+          <p:cNvPr id="3" name="Notes Placeholder 2"/>
+          <p:cNvSpPr>
+            <a:spLocks noGrp="1"/>
+          </p:cNvSpPr>
+          <p:nvPr>
+            <p:ph type="body" idx="1"/>
+          </p:nvPr>
+        </p:nvSpPr>
+        <p:spPr/>
+        <p:txBody>
+          <a:bodyPr/>
+          <a:lstStyle/>
+          <a:p>
+            <a:endParaRPr lang="en-US" baseline="0" dirty="0"/>
+          </a:p>
+        </p:txBody>
+      </p:sp>
+      <p:sp>
+        <p:nvSpPr>
+          <p:cNvPr id="4" name="Slide Number Placeholder 3"/>
+          <p:cNvSpPr>
+            <a:spLocks noGrp="1"/>
+          </p:cNvSpPr>
+          <p:nvPr>
+            <p:ph type="sldNum" sz="quarter" idx="10"/>
+          </p:nvPr>
+        </p:nvSpPr>
+        <p:spPr/>
+        <p:txBody>
+          <a:bodyPr/>
+          <a:lstStyle/>
+          <a:p>
+            <a:fld id="{F1403DF4-FF6B-E849-AB5B-E7CD2E3C2037}" type="slidenum">
+              <a:rPr lang="en-US" smtClean="0"/>
+              <a:t>20</a:t>
             </a:fld>
             <a:endParaRPr lang="en-US"/>
           </a:p>
@@ -1481,7 +1659,7 @@
           <a:bodyPr/>
           <a:lstStyle/>
           <a:p>
-            <a:endParaRPr lang="en-US" dirty="0"/>
+            <a:endParaRPr lang="en-US" baseline="0" dirty="0" smtClean="0"/>
           </a:p>
         </p:txBody>
       </p:sp>
@@ -1511,7 +1689,7 @@
     </p:spTree>
     <p:extLst>
       <p:ext uri="{BB962C8B-B14F-4D97-AF65-F5344CB8AC3E}">
-        <p14:creationId xmlns:p14="http://schemas.microsoft.com/office/powerpoint/2010/main" val="1540726849"/>
+        <p14:creationId xmlns:p14="http://schemas.microsoft.com/office/powerpoint/2010/main" val="572200950"/>
       </p:ext>
     </p:extLst>
   </p:cSld>
@@ -1565,7 +1743,11 @@
           <a:bodyPr/>
           <a:lstStyle/>
           <a:p>
-            <a:endParaRPr lang="en-US" baseline="0" dirty="0" smtClean="0"/>
+            <a:r>
+              <a:rPr lang="en-US" dirty="0" smtClean="0"/>
+              <a:t>3 types of behaviors</a:t>
+            </a:r>
+            <a:endParaRPr lang="en-US" dirty="0"/>
           </a:p>
         </p:txBody>
       </p:sp>
@@ -1595,7 +1777,7 @@
     </p:spTree>
     <p:extLst>
       <p:ext uri="{BB962C8B-B14F-4D97-AF65-F5344CB8AC3E}">
-        <p14:creationId xmlns:p14="http://schemas.microsoft.com/office/powerpoint/2010/main" val="572200950"/>
+        <p14:creationId xmlns:p14="http://schemas.microsoft.com/office/powerpoint/2010/main" val="1776131732"/>
       </p:ext>
     </p:extLst>
   </p:cSld>
@@ -1653,6 +1835,16 @@
               <a:rPr lang="en-US" dirty="0" smtClean="0"/>
               <a:t>3 types of behaviors</a:t>
             </a:r>
+          </a:p>
+          <a:p>
+            <a:r>
+              <a:rPr lang="en-US" dirty="0" smtClean="0"/>
+              <a:t>- A</a:t>
+            </a:r>
+            <a:r>
+              <a:rPr lang="en-US" baseline="0" dirty="0" smtClean="0"/>
+              <a:t> diverging weekend</a:t>
+            </a:r>
             <a:endParaRPr lang="en-US" dirty="0"/>
           </a:p>
         </p:txBody>
@@ -1683,7 +1875,7 @@
     </p:spTree>
     <p:extLst>
       <p:ext uri="{BB962C8B-B14F-4D97-AF65-F5344CB8AC3E}">
-        <p14:creationId xmlns:p14="http://schemas.microsoft.com/office/powerpoint/2010/main" val="1776131732"/>
+        <p14:creationId xmlns:p14="http://schemas.microsoft.com/office/powerpoint/2010/main" val="2070036440"/>
       </p:ext>
     </p:extLst>
   </p:cSld>
@@ -1781,7 +1973,7 @@
     </p:spTree>
     <p:extLst>
       <p:ext uri="{BB962C8B-B14F-4D97-AF65-F5344CB8AC3E}">
-        <p14:creationId xmlns:p14="http://schemas.microsoft.com/office/powerpoint/2010/main" val="2070036440"/>
+        <p14:creationId xmlns:p14="http://schemas.microsoft.com/office/powerpoint/2010/main" val="775187827"/>
       </p:ext>
     </p:extLst>
   </p:cSld>
@@ -5075,8 +5267,8 @@
         </p:nvCxnSpPr>
         <p:spPr>
           <a:xfrm flipH="1">
-            <a:off x="9470571" y="1828800"/>
-            <a:ext cx="326572" cy="800100"/>
+            <a:off x="9465733" y="1897605"/>
+            <a:ext cx="212876" cy="1533681"/>
           </a:xfrm>
           <a:prstGeom prst="straightConnector1">
             <a:avLst/>
@@ -5111,8 +5303,8 @@
         </p:nvCxnSpPr>
         <p:spPr>
           <a:xfrm flipV="1">
-            <a:off x="7560128" y="4789714"/>
-            <a:ext cx="397329" cy="647701"/>
+            <a:off x="7560128" y="4097867"/>
+            <a:ext cx="686405" cy="1339549"/>
           </a:xfrm>
           <a:prstGeom prst="straightConnector1">
             <a:avLst/>
@@ -5147,8 +5339,8 @@
         </p:nvSpPr>
         <p:spPr>
           <a:xfrm>
-            <a:off x="6566805" y="5463077"/>
-            <a:ext cx="2318657" cy="369332"/>
+            <a:off x="6278937" y="5505149"/>
+            <a:ext cx="5185533" cy="369332"/>
           </a:xfrm>
           <a:prstGeom prst="rect">
             <a:avLst/>
@@ -5167,7 +5359,23 @@
                   <a:schemeClr val="accent5"/>
                 </a:solidFill>
               </a:rPr>
-              <a:t>A diverging weekend</a:t>
+              <a:t>Rise in </a:t>
+            </a:r>
+            <a:r>
+              <a:rPr lang="en-US" b="1" smtClean="0">
+                <a:solidFill>
+                  <a:schemeClr val="accent5"/>
+                </a:solidFill>
+              </a:rPr>
+              <a:t>nighttime pattern volume </a:t>
+            </a:r>
+            <a:r>
+              <a:rPr lang="en-US" b="1" dirty="0" smtClean="0">
+                <a:solidFill>
+                  <a:schemeClr val="accent5"/>
+                </a:solidFill>
+              </a:rPr>
+              <a:t>over weekdays</a:t>
             </a:r>
             <a:endParaRPr lang="en-US" b="1" dirty="0">
               <a:solidFill>
@@ -5177,10 +5385,122 @@
           </a:p>
         </p:txBody>
       </p:sp>
+      <p:sp>
+        <p:nvSpPr>
+          <p:cNvPr id="12" name="TextBox 11"/>
+          <p:cNvSpPr txBox="1"/>
+          <p:nvPr/>
+        </p:nvSpPr>
+        <p:spPr>
+          <a:xfrm>
+            <a:off x="8968012" y="1444875"/>
+            <a:ext cx="2690587" cy="369332"/>
+          </a:xfrm>
+          <a:prstGeom prst="rect">
+            <a:avLst/>
+          </a:prstGeom>
+          <a:noFill/>
+        </p:spPr>
+        <p:txBody>
+          <a:bodyPr wrap="square" rtlCol="0">
+            <a:spAutoFit/>
+          </a:bodyPr>
+          <a:lstStyle/>
+          <a:p>
+            <a:r>
+              <a:rPr lang="en-US" b="1" smtClean="0">
+                <a:solidFill>
+                  <a:schemeClr val="accent5"/>
+                </a:solidFill>
+              </a:rPr>
+              <a:t>Culminating in Thursday</a:t>
+            </a:r>
+            <a:endParaRPr lang="en-US" b="1" dirty="0">
+              <a:solidFill>
+                <a:schemeClr val="accent5"/>
+              </a:solidFill>
+            </a:endParaRPr>
+          </a:p>
+        </p:txBody>
+      </p:sp>
+      <p:cxnSp>
+        <p:nvCxnSpPr>
+          <p:cNvPr id="13" name="Straight Arrow Connector 12"/>
+          <p:cNvCxnSpPr/>
+          <p:nvPr/>
+        </p:nvCxnSpPr>
+        <p:spPr>
+          <a:xfrm>
+            <a:off x="3166534" y="3049143"/>
+            <a:ext cx="580570" cy="764287"/>
+          </a:xfrm>
+          <a:prstGeom prst="straightConnector1">
+            <a:avLst/>
+          </a:prstGeom>
+          <a:ln w="57150">
+            <a:solidFill>
+              <a:schemeClr val="accent5"/>
+            </a:solidFill>
+            <a:tailEnd type="triangle"/>
+          </a:ln>
+        </p:spPr>
+        <p:style>
+          <a:lnRef idx="1">
+            <a:schemeClr val="accent1"/>
+          </a:lnRef>
+          <a:fillRef idx="0">
+            <a:schemeClr val="accent1"/>
+          </a:fillRef>
+          <a:effectRef idx="0">
+            <a:schemeClr val="accent1"/>
+          </a:effectRef>
+          <a:fontRef idx="minor">
+            <a:schemeClr val="tx1"/>
+          </a:fontRef>
+        </p:style>
+      </p:cxnSp>
+      <p:sp>
+        <p:nvSpPr>
+          <p:cNvPr id="15" name="TextBox 14"/>
+          <p:cNvSpPr txBox="1"/>
+          <p:nvPr/>
+        </p:nvSpPr>
+        <p:spPr>
+          <a:xfrm>
+            <a:off x="1815492" y="2598250"/>
+            <a:ext cx="2816377" cy="369332"/>
+          </a:xfrm>
+          <a:prstGeom prst="rect">
+            <a:avLst/>
+          </a:prstGeom>
+          <a:noFill/>
+        </p:spPr>
+        <p:txBody>
+          <a:bodyPr wrap="square" rtlCol="0">
+            <a:spAutoFit/>
+          </a:bodyPr>
+          <a:lstStyle/>
+          <a:p>
+            <a:r>
+              <a:rPr lang="en-US" b="1" dirty="0" smtClean="0">
+                <a:solidFill>
+                  <a:schemeClr val="accent5"/>
+                </a:solidFill>
+              </a:rPr>
+              <a:t>Uniform weekday mornings</a:t>
+            </a:r>
+            <a:endParaRPr lang="en-US" b="1" dirty="0">
+              <a:solidFill>
+                <a:schemeClr val="accent5"/>
+              </a:solidFill>
+            </a:endParaRPr>
+          </a:p>
+        </p:txBody>
+      </p:sp>
     </p:spTree>
     <p:extLst>
       <p:ext uri="{BB962C8B-B14F-4D97-AF65-F5344CB8AC3E}">
-        <p14:creationId xmlns:p14="http://schemas.microsoft.com/office/powerpoint/2010/main" val="1759048606"/>
+        <p14:creationId xmlns:p14="http://schemas.microsoft.com/office/powerpoint/2010/main" val="25856303"/>
       </p:ext>
     </p:extLst>
   </p:cSld>
@@ -5200,6 +5520,14 @@
 <file path=ppt/slides/slide11.xml><?xml version="1.0" encoding="utf-8"?>
 <p:sld xmlns:a="http://schemas.openxmlformats.org/drawingml/2006/main" xmlns:r="http://schemas.openxmlformats.org/officeDocument/2006/relationships" xmlns:p="http://schemas.openxmlformats.org/presentationml/2006/main">
   <p:cSld>
+    <p:bg>
+      <p:bgPr>
+        <a:solidFill>
+          <a:srgbClr val="FBFBFB"/>
+        </a:solidFill>
+        <a:effectLst/>
+      </p:bgPr>
+    </p:bg>
     <p:spTree>
       <p:nvGrpSpPr>
         <p:cNvPr id="1" name=""/>
@@ -5216,6 +5544,362 @@
       </p:grpSpPr>
       <p:sp>
         <p:nvSpPr>
+          <p:cNvPr id="4" name="Shape 249"/>
+          <p:cNvSpPr txBox="1">
+            <a:spLocks noGrp="1"/>
+          </p:cNvSpPr>
+          <p:nvPr>
+            <p:ph type="title"/>
+          </p:nvPr>
+        </p:nvSpPr>
+        <p:spPr>
+          <a:xfrm>
+            <a:off x="983192" y="453127"/>
+            <a:ext cx="10428818" cy="1138238"/>
+          </a:xfrm>
+          <a:prstGeom prst="rect">
+            <a:avLst/>
+          </a:prstGeom>
+          <a:noFill/>
+          <a:ln>
+            <a:noFill/>
+          </a:ln>
+        </p:spPr>
+        <p:txBody>
+          <a:bodyPr lIns="91375" tIns="45675" rIns="91375" bIns="45675" anchor="ctr" anchorCtr="0">
+            <a:noAutofit/>
+          </a:bodyPr>
+          <a:lstStyle/>
+          <a:p>
+            <a:pPr marL="0" marR="0" lvl="0" indent="0" rtl="0">
+              <a:lnSpc>
+                <a:spcPct val="90000"/>
+              </a:lnSpc>
+              <a:spcBef>
+                <a:spcPts val="0"/>
+              </a:spcBef>
+              <a:spcAft>
+                <a:spcPts val="0"/>
+              </a:spcAft>
+              <a:buSzPct val="25000"/>
+              <a:buNone/>
+            </a:pPr>
+            <a:r>
+              <a:rPr lang="en-US" sz="3000" b="1" dirty="0" smtClean="0">
+                <a:solidFill>
+                  <a:schemeClr val="accent5"/>
+                </a:solidFill>
+                <a:latin typeface="Corbel" charset="0"/>
+                <a:ea typeface="Corbel" charset="0"/>
+                <a:cs typeface="Corbel" charset="0"/>
+                <a:sym typeface="Calibri"/>
+              </a:rPr>
+              <a:t>Month-to-Month Fluctuation of Day of Week Ride Volumes</a:t>
+            </a:r>
+            <a:endParaRPr lang="en-US" sz="3000" b="1" i="0" u="none" strike="noStrike" cap="none" dirty="0">
+              <a:solidFill>
+                <a:schemeClr val="accent5"/>
+              </a:solidFill>
+              <a:latin typeface="Corbel" charset="0"/>
+              <a:ea typeface="Corbel" charset="0"/>
+              <a:cs typeface="Corbel" charset="0"/>
+              <a:sym typeface="Calibri"/>
+            </a:endParaRPr>
+          </a:p>
+        </p:txBody>
+      </p:sp>
+      <p:pic>
+        <p:nvPicPr>
+          <p:cNvPr id="6" name="Picture 5"/>
+          <p:cNvPicPr>
+            <a:picLocks noChangeAspect="1"/>
+          </p:cNvPicPr>
+          <p:nvPr/>
+        </p:nvPicPr>
+        <p:blipFill>
+          <a:blip r:embed="rId3">
+            <a:extLst>
+              <a:ext uri="{28A0092B-C50C-407E-A947-70E740481C1C}">
+                <a14:useLocalDpi xmlns:a14="http://schemas.microsoft.com/office/drawing/2010/main" val="0"/>
+              </a:ext>
+            </a:extLst>
+          </a:blip>
+          <a:stretch>
+            <a:fillRect/>
+          </a:stretch>
+        </p:blipFill>
+        <p:spPr>
+          <a:xfrm>
+            <a:off x="1168401" y="1406699"/>
+            <a:ext cx="10058400" cy="5356098"/>
+          </a:xfrm>
+          <a:prstGeom prst="rect">
+            <a:avLst/>
+          </a:prstGeom>
+        </p:spPr>
+      </p:pic>
+      <p:cxnSp>
+        <p:nvCxnSpPr>
+          <p:cNvPr id="7" name="Straight Arrow Connector 6"/>
+          <p:cNvCxnSpPr/>
+          <p:nvPr/>
+        </p:nvCxnSpPr>
+        <p:spPr>
+          <a:xfrm flipH="1">
+            <a:off x="8856133" y="1897605"/>
+            <a:ext cx="822476" cy="1031862"/>
+          </a:xfrm>
+          <a:prstGeom prst="straightConnector1">
+            <a:avLst/>
+          </a:prstGeom>
+          <a:ln w="57150">
+            <a:solidFill>
+              <a:schemeClr val="accent5"/>
+            </a:solidFill>
+            <a:tailEnd type="triangle"/>
+          </a:ln>
+        </p:spPr>
+        <p:style>
+          <a:lnRef idx="1">
+            <a:schemeClr val="accent1"/>
+          </a:lnRef>
+          <a:fillRef idx="0">
+            <a:schemeClr val="accent1"/>
+          </a:fillRef>
+          <a:effectRef idx="0">
+            <a:schemeClr val="accent1"/>
+          </a:effectRef>
+          <a:fontRef idx="minor">
+            <a:schemeClr val="tx1"/>
+          </a:fontRef>
+        </p:style>
+      </p:cxnSp>
+      <p:sp>
+        <p:nvSpPr>
+          <p:cNvPr id="8" name="TextBox 7"/>
+          <p:cNvSpPr txBox="1"/>
+          <p:nvPr/>
+        </p:nvSpPr>
+        <p:spPr>
+          <a:xfrm>
+            <a:off x="9267371" y="1440565"/>
+            <a:ext cx="2690587" cy="369332"/>
+          </a:xfrm>
+          <a:prstGeom prst="rect">
+            <a:avLst/>
+          </a:prstGeom>
+          <a:noFill/>
+        </p:spPr>
+        <p:txBody>
+          <a:bodyPr wrap="square" rtlCol="0">
+            <a:spAutoFit/>
+          </a:bodyPr>
+          <a:lstStyle/>
+          <a:p>
+            <a:r>
+              <a:rPr lang="en-US" b="1" smtClean="0">
+                <a:solidFill>
+                  <a:schemeClr val="accent5"/>
+                </a:solidFill>
+              </a:rPr>
+              <a:t>High Sept. </a:t>
+            </a:r>
+            <a:r>
+              <a:rPr lang="en-US" b="1" dirty="0" smtClean="0">
+                <a:solidFill>
+                  <a:schemeClr val="accent5"/>
+                </a:solidFill>
+              </a:rPr>
+              <a:t>usage</a:t>
+            </a:r>
+            <a:endParaRPr lang="en-US" b="1" dirty="0">
+              <a:solidFill>
+                <a:schemeClr val="accent5"/>
+              </a:solidFill>
+            </a:endParaRPr>
+          </a:p>
+        </p:txBody>
+      </p:sp>
+    </p:spTree>
+    <p:extLst>
+      <p:ext uri="{BB962C8B-B14F-4D97-AF65-F5344CB8AC3E}">
+        <p14:creationId xmlns:p14="http://schemas.microsoft.com/office/powerpoint/2010/main" val="1598789559"/>
+      </p:ext>
+    </p:extLst>
+  </p:cSld>
+  <p:clrMapOvr>
+    <a:masterClrMapping/>
+  </p:clrMapOvr>
+  <p:timing>
+    <p:tnLst>
+      <p:par>
+        <p:cTn id="1" dur="indefinite" restart="never" nodeType="tmRoot"/>
+      </p:par>
+    </p:tnLst>
+  </p:timing>
+</p:sld>
+</file>
+
+<file path=ppt/slides/slide12.xml><?xml version="1.0" encoding="utf-8"?>
+<p:sld xmlns:a="http://schemas.openxmlformats.org/drawingml/2006/main" xmlns:r="http://schemas.openxmlformats.org/officeDocument/2006/relationships" xmlns:p="http://schemas.openxmlformats.org/presentationml/2006/main">
+  <p:cSld>
+    <p:bg>
+      <p:bgPr>
+        <a:solidFill>
+          <a:srgbClr val="FBFBFB"/>
+        </a:solidFill>
+        <a:effectLst/>
+      </p:bgPr>
+    </p:bg>
+    <p:spTree>
+      <p:nvGrpSpPr>
+        <p:cNvPr id="1" name=""/>
+        <p:cNvGrpSpPr/>
+        <p:nvPr/>
+      </p:nvGrpSpPr>
+      <p:grpSpPr>
+        <a:xfrm>
+          <a:off x="0" y="0"/>
+          <a:ext cx="0" cy="0"/>
+          <a:chOff x="0" y="0"/>
+          <a:chExt cx="0" cy="0"/>
+        </a:xfrm>
+      </p:grpSpPr>
+      <p:sp>
+        <p:nvSpPr>
+          <p:cNvPr id="4" name="Shape 249"/>
+          <p:cNvSpPr txBox="1">
+            <a:spLocks noGrp="1"/>
+          </p:cNvSpPr>
+          <p:nvPr>
+            <p:ph type="title"/>
+          </p:nvPr>
+        </p:nvSpPr>
+        <p:spPr>
+          <a:xfrm>
+            <a:off x="983192" y="453127"/>
+            <a:ext cx="10428818" cy="1138238"/>
+          </a:xfrm>
+          <a:prstGeom prst="rect">
+            <a:avLst/>
+          </a:prstGeom>
+          <a:noFill/>
+          <a:ln>
+            <a:noFill/>
+          </a:ln>
+        </p:spPr>
+        <p:txBody>
+          <a:bodyPr lIns="91375" tIns="45675" rIns="91375" bIns="45675" anchor="ctr" anchorCtr="0">
+            <a:noAutofit/>
+          </a:bodyPr>
+          <a:lstStyle/>
+          <a:p>
+            <a:pPr marL="0" marR="0" lvl="0" indent="0" rtl="0">
+              <a:lnSpc>
+                <a:spcPct val="90000"/>
+              </a:lnSpc>
+              <a:spcBef>
+                <a:spcPts val="0"/>
+              </a:spcBef>
+              <a:spcAft>
+                <a:spcPts val="0"/>
+              </a:spcAft>
+              <a:buSzPct val="25000"/>
+              <a:buNone/>
+            </a:pPr>
+            <a:r>
+              <a:rPr lang="en-US" sz="3000" b="1" dirty="0" smtClean="0">
+                <a:solidFill>
+                  <a:schemeClr val="accent5"/>
+                </a:solidFill>
+                <a:latin typeface="Corbel" charset="0"/>
+                <a:ea typeface="Corbel" charset="0"/>
+                <a:cs typeface="Corbel" charset="0"/>
+                <a:sym typeface="Calibri"/>
+              </a:rPr>
+              <a:t>Theoretical Explanations for Month-to-Month Fluctuation </a:t>
+            </a:r>
+            <a:endParaRPr lang="en-US" sz="3000" b="1" i="0" u="none" strike="noStrike" cap="none" dirty="0">
+              <a:solidFill>
+                <a:schemeClr val="accent5"/>
+              </a:solidFill>
+              <a:latin typeface="Corbel" charset="0"/>
+              <a:ea typeface="Corbel" charset="0"/>
+              <a:cs typeface="Corbel" charset="0"/>
+              <a:sym typeface="Calibri"/>
+            </a:endParaRPr>
+          </a:p>
+        </p:txBody>
+      </p:sp>
+      <p:pic>
+        <p:nvPicPr>
+          <p:cNvPr id="2" name="Picture 1"/>
+          <p:cNvPicPr>
+            <a:picLocks noChangeAspect="1"/>
+          </p:cNvPicPr>
+          <p:nvPr/>
+        </p:nvPicPr>
+        <p:blipFill>
+          <a:blip r:embed="rId3">
+            <a:extLst>
+              <a:ext uri="{28A0092B-C50C-407E-A947-70E740481C1C}">
+                <a14:useLocalDpi xmlns:a14="http://schemas.microsoft.com/office/drawing/2010/main" val="0"/>
+              </a:ext>
+            </a:extLst>
+          </a:blip>
+          <a:stretch>
+            <a:fillRect/>
+          </a:stretch>
+        </p:blipFill>
+        <p:spPr>
+          <a:xfrm>
+            <a:off x="983191" y="1591365"/>
+            <a:ext cx="7991475" cy="4393062"/>
+          </a:xfrm>
+          <a:prstGeom prst="rect">
+            <a:avLst/>
+          </a:prstGeom>
+        </p:spPr>
+      </p:pic>
+    </p:spTree>
+    <p:extLst>
+      <p:ext uri="{BB962C8B-B14F-4D97-AF65-F5344CB8AC3E}">
+        <p14:creationId xmlns:p14="http://schemas.microsoft.com/office/powerpoint/2010/main" val="1681163553"/>
+      </p:ext>
+    </p:extLst>
+  </p:cSld>
+  <p:clrMapOvr>
+    <a:masterClrMapping/>
+  </p:clrMapOvr>
+  <p:timing>
+    <p:tnLst>
+      <p:par>
+        <p:cTn id="1" dur="indefinite" restart="never" nodeType="tmRoot"/>
+      </p:par>
+    </p:tnLst>
+  </p:timing>
+</p:sld>
+</file>
+
+<file path=ppt/slides/slide13.xml><?xml version="1.0" encoding="utf-8"?>
+<p:sld xmlns:a="http://schemas.openxmlformats.org/drawingml/2006/main" xmlns:r="http://schemas.openxmlformats.org/officeDocument/2006/relationships" xmlns:p="http://schemas.openxmlformats.org/presentationml/2006/main">
+  <p:cSld>
+    <p:spTree>
+      <p:nvGrpSpPr>
+        <p:cNvPr id="1" name=""/>
+        <p:cNvGrpSpPr/>
+        <p:nvPr/>
+      </p:nvGrpSpPr>
+      <p:grpSpPr>
+        <a:xfrm>
+          <a:off x="0" y="0"/>
+          <a:ext cx="0" cy="0"/>
+          <a:chOff x="0" y="0"/>
+          <a:chExt cx="0" cy="0"/>
+        </a:xfrm>
+      </p:grpSpPr>
+      <p:sp>
+        <p:nvSpPr>
           <p:cNvPr id="2" name="Title 1"/>
           <p:cNvSpPr>
             <a:spLocks noGrp="1"/>
@@ -5266,7 +5950,7 @@
 </p:sld>
 </file>
 
-<file path=ppt/slides/slide12.xml><?xml version="1.0" encoding="utf-8"?>
+<file path=ppt/slides/slide14.xml><?xml version="1.0" encoding="utf-8"?>
 <p:sld xmlns:a="http://schemas.openxmlformats.org/drawingml/2006/main" xmlns:r="http://schemas.openxmlformats.org/officeDocument/2006/relationships" xmlns:p="http://schemas.openxmlformats.org/presentationml/2006/main">
   <p:cSld>
     <p:bg>
@@ -5407,7 +6091,7 @@
 </p:sld>
 </file>
 
-<file path=ppt/slides/slide13.xml><?xml version="1.0" encoding="utf-8"?>
+<file path=ppt/slides/slide15.xml><?xml version="1.0" encoding="utf-8"?>
 <p:sld xmlns:a="http://schemas.openxmlformats.org/drawingml/2006/main" xmlns:r="http://schemas.openxmlformats.org/officeDocument/2006/relationships" xmlns:p="http://schemas.openxmlformats.org/presentationml/2006/main">
   <p:cSld>
     <p:bg>
@@ -5572,7 +6256,7 @@
 </p:sld>
 </file>
 
-<file path=ppt/slides/slide14.xml><?xml version="1.0" encoding="utf-8"?>
+<file path=ppt/slides/slide16.xml><?xml version="1.0" encoding="utf-8"?>
 <p:sld xmlns:a="http://schemas.openxmlformats.org/drawingml/2006/main" xmlns:r="http://schemas.openxmlformats.org/officeDocument/2006/relationships" xmlns:p="http://schemas.openxmlformats.org/presentationml/2006/main">
   <p:cSld>
     <p:bg>
@@ -5713,7 +6397,7 @@
 </p:sld>
 </file>
 
-<file path=ppt/slides/slide15.xml><?xml version="1.0" encoding="utf-8"?>
+<file path=ppt/slides/slide17.xml><?xml version="1.0" encoding="utf-8"?>
 <p:sld xmlns:a="http://schemas.openxmlformats.org/drawingml/2006/main" xmlns:r="http://schemas.openxmlformats.org/officeDocument/2006/relationships" xmlns:p="http://schemas.openxmlformats.org/presentationml/2006/main">
   <p:cSld>
     <p:bg>
@@ -6202,7 +6886,7 @@
 </p:sld>
 </file>
 
-<file path=ppt/slides/slide16.xml><?xml version="1.0" encoding="utf-8"?>
+<file path=ppt/slides/slide18.xml><?xml version="1.0" encoding="utf-8"?>
 <p:sld xmlns:a="http://schemas.openxmlformats.org/drawingml/2006/main" xmlns:r="http://schemas.openxmlformats.org/officeDocument/2006/relationships" xmlns:p="http://schemas.openxmlformats.org/presentationml/2006/main">
   <p:cSld>
     <p:bg>
@@ -6239,7 +6923,7 @@
         </p:nvSpPr>
         <p:spPr>
           <a:xfrm>
-            <a:off x="628648" y="287357"/>
+            <a:off x="831849" y="287357"/>
             <a:ext cx="11360151" cy="1138238"/>
           </a:xfrm>
           <a:prstGeom prst="rect">
@@ -6279,7 +6963,7 @@
                 <a:cs typeface="Corbel" charset="0"/>
                 <a:sym typeface="Calibri"/>
               </a:rPr>
-              <a:t>Trace line graph of volume by month. </a:t>
+              <a:t>Uber Rides over of volume by month. </a:t>
             </a:r>
             <a:endParaRPr lang="en-US" sz="3000" b="1" i="0" u="none" strike="noStrike" cap="none" dirty="0">
               <a:solidFill>
@@ -6295,7 +6979,7 @@
       </p:sp>
       <p:pic>
         <p:nvPicPr>
-          <p:cNvPr id="3" name="Picture 2"/>
+          <p:cNvPr id="6" name="Picture 5"/>
           <p:cNvPicPr>
             <a:picLocks noChangeAspect="1"/>
           </p:cNvPicPr>
@@ -6315,8 +6999,8 @@
         </p:blipFill>
         <p:spPr>
           <a:xfrm>
-            <a:off x="628648" y="1151467"/>
-            <a:ext cx="10716494" cy="5706533"/>
+            <a:off x="1119716" y="1191216"/>
+            <a:ext cx="10201371" cy="5432230"/>
           </a:xfrm>
           <a:prstGeom prst="rect">
             <a:avLst/>
@@ -6343,7 +7027,7 @@
 </p:sld>
 </file>
 
-<file path=ppt/slides/slide17.xml><?xml version="1.0" encoding="utf-8"?>
+<file path=ppt/slides/slide19.xml><?xml version="1.0" encoding="utf-8"?>
 <p:sld xmlns:a="http://schemas.openxmlformats.org/drawingml/2006/main" xmlns:r="http://schemas.openxmlformats.org/officeDocument/2006/relationships" xmlns:p="http://schemas.openxmlformats.org/presentationml/2006/main">
   <p:cSld>
     <p:spTree>
@@ -6412,7 +7096,7 @@
 </p:sld>
 </file>
 
-<file path=ppt/slides/slide18.xml><?xml version="1.0" encoding="utf-8"?>
+<file path=ppt/slides/slide2.xml><?xml version="1.0" encoding="utf-8"?>
 <p:sld xmlns:a="http://schemas.openxmlformats.org/drawingml/2006/main" xmlns:r="http://schemas.openxmlformats.org/officeDocument/2006/relationships" xmlns:p="http://schemas.openxmlformats.org/presentationml/2006/main">
   <p:cSld>
     <p:bg>
@@ -6628,7 +7312,7 @@
         </p:nvSpPr>
         <p:spPr>
           <a:xfrm>
-            <a:off x="692818" y="1773055"/>
+            <a:off x="701171" y="1789384"/>
             <a:ext cx="11133046" cy="4571998"/>
           </a:xfrm>
           <a:prstGeom prst="rect">
@@ -6859,23 +7543,17 @@
               <a:buSzPct val="25000"/>
             </a:pPr>
             <a:r>
-              <a:rPr lang="en-US" b="1" dirty="0" smtClean="0">
+              <a:rPr lang="en-US" b="1" i="0" u="none" strike="noStrike" kern="1200" cap="none">
                 <a:solidFill>
                   <a:srgbClr val="FFFFFF"/>
                 </a:solidFill>
+                <a:latin typeface="+mj-lt"/>
+                <a:ea typeface="+mj-ea"/>
+                <a:cs typeface="+mj-cs"/>
                 <a:sym typeface="Calibri"/>
               </a:rPr>
-              <a:t>Conclusion</a:t>
-            </a:r>
-            <a:endParaRPr lang="en-US" b="1" i="0" u="none" strike="noStrike" kern="1200" cap="none" dirty="0">
-              <a:solidFill>
-                <a:srgbClr val="FFFFFF"/>
-              </a:solidFill>
-              <a:latin typeface="+mj-lt"/>
-              <a:ea typeface="+mj-ea"/>
-              <a:cs typeface="+mj-cs"/>
-              <a:sym typeface="Calibri"/>
-            </a:endParaRPr>
+              <a:t>Motivation:</a:t>
+            </a:r>
           </a:p>
         </p:txBody>
       </p:sp>
@@ -6889,8 +7567,8 @@
         </p:nvSpPr>
         <p:spPr>
           <a:xfrm>
-            <a:off x="6090574" y="801866"/>
-            <a:ext cx="5306084" cy="5230634"/>
+            <a:off x="5967811" y="2066211"/>
+            <a:ext cx="5800141" cy="2991888"/>
           </a:xfrm>
           <a:prstGeom prst="rect">
             <a:avLst/>
@@ -6898,7 +7576,7 @@
         </p:spPr>
         <p:txBody>
           <a:bodyPr vert="horz" lIns="91440" tIns="45720" rIns="91440" bIns="45720" rtlCol="0" anchor="ctr" anchorCtr="0">
-            <a:normAutofit/>
+            <a:normAutofit fontScale="85000" lnSpcReduction="20000"/>
           </a:bodyPr>
           <a:lstStyle>
             <a:lvl1pPr marL="228600" indent="-228600" algn="l" defTabSz="914400" rtl="0" eaLnBrk="1" latinLnBrk="0" hangingPunct="1">
@@ -7065,17 +7743,74 @@
             </a:lvl9pPr>
           </a:lstStyle>
           <a:p>
+            <a:pPr marL="114300" indent="0">
+              <a:buNone/>
+            </a:pPr>
+            <a:r>
+              <a:rPr lang="en-US" sz="2200" b="1" dirty="0" smtClean="0">
+                <a:solidFill>
+                  <a:srgbClr val="000000"/>
+                </a:solidFill>
+              </a:rPr>
+              <a:t>Individual-level behavior =&gt; Macro Changes</a:t>
+            </a:r>
+          </a:p>
+          <a:p>
+            <a:pPr marL="114300" indent="0">
+              <a:buNone/>
+            </a:pPr>
+            <a:r>
+              <a:rPr lang="en-US" sz="2200" dirty="0" smtClean="0">
+                <a:solidFill>
+                  <a:srgbClr val="000000"/>
+                </a:solidFill>
+              </a:rPr>
+              <a:t>(Individuals Visualized &amp; Temporal Trends)</a:t>
+            </a:r>
+            <a:endParaRPr lang="en-US" sz="2200" b="1" dirty="0">
+              <a:solidFill>
+                <a:srgbClr val="000000"/>
+              </a:solidFill>
+            </a:endParaRPr>
+          </a:p>
+          <a:p>
+            <a:pPr marL="114300" indent="0">
+              <a:buNone/>
+            </a:pPr>
+            <a:endParaRPr lang="en-US" sz="2200" b="1" dirty="0" smtClean="0">
+              <a:solidFill>
+                <a:srgbClr val="000000"/>
+              </a:solidFill>
+            </a:endParaRPr>
+          </a:p>
+          <a:p>
             <a:pPr marL="342900">
               <a:buFont typeface="Arial" panose="020B0604020202020204" pitchFamily="34" charset="0"/>
               <a:buChar char="•"/>
             </a:pPr>
             <a:r>
-              <a:rPr lang="en-US" sz="2400">
+              <a:rPr lang="en-US" sz="2200" dirty="0" smtClean="0">
                 <a:solidFill>
                   <a:srgbClr val="000000"/>
                 </a:solidFill>
               </a:rPr>
-              <a:t>People in NYC</a:t>
+              <a:t>Phrase-out of government run v. private sector transportation (taxi, subway, </a:t>
+            </a:r>
+            <a:r>
+              <a:rPr lang="en-US" sz="2200" dirty="0" err="1" smtClean="0">
+                <a:solidFill>
+                  <a:srgbClr val="000000"/>
+                </a:solidFill>
+              </a:rPr>
+              <a:t>uber</a:t>
+            </a:r>
+            <a:r>
+              <a:rPr lang="en-US" sz="2200" dirty="0" smtClean="0">
+                <a:solidFill>
+                  <a:srgbClr val="000000"/>
+                </a:solidFill>
+              </a:rPr>
+              <a:t>)</a:t>
             </a:r>
           </a:p>
           <a:p>
@@ -7084,12 +7819,31 @@
               <a:buChar char="•"/>
             </a:pPr>
             <a:r>
-              <a:rPr lang="en-US" sz="2400">
+              <a:rPr lang="en-US" sz="2200" dirty="0">
                 <a:solidFill>
                   <a:srgbClr val="000000"/>
                 </a:solidFill>
               </a:rPr>
-              <a:t>Rise of Uber/Lyft/ride-sharing in contrast to old taxi usage</a:t>
+              <a:t>Adoption of autonomous vehicles </a:t>
+            </a:r>
+            <a:endParaRPr lang="en-US" sz="2200" dirty="0" smtClean="0">
+              <a:solidFill>
+                <a:srgbClr val="000000"/>
+              </a:solidFill>
+            </a:endParaRPr>
+          </a:p>
+          <a:p>
+            <a:pPr marL="800100" lvl="1">
+              <a:buFont typeface="Arial" panose="020B0604020202020204" pitchFamily="34" charset="0"/>
+              <a:buChar char="•"/>
+            </a:pPr>
+            <a:r>
+              <a:rPr lang="en-US" sz="1800" dirty="0" smtClean="0">
+                <a:solidFill>
+                  <a:srgbClr val="000000"/>
+                </a:solidFill>
+              </a:rPr>
+              <a:t>Tech savvy adoption</a:t>
             </a:r>
           </a:p>
           <a:p>
@@ -7098,12 +7852,20 @@
               <a:buChar char="•"/>
             </a:pPr>
             <a:r>
-              <a:rPr lang="en-US" sz="2400">
+              <a:rPr lang="en-US" sz="2200" dirty="0">
                 <a:solidFill>
                   <a:srgbClr val="000000"/>
                 </a:solidFill>
               </a:rPr>
-              <a:t>Traffic in general/environment</a:t>
+              <a:t>G</a:t>
+            </a:r>
+            <a:r>
+              <a:rPr lang="en-US" sz="2200" dirty="0" smtClean="0">
+                <a:solidFill>
+                  <a:srgbClr val="000000"/>
+                </a:solidFill>
+              </a:rPr>
+              <a:t>eneral transportation structures</a:t>
             </a:r>
           </a:p>
           <a:p>
@@ -7111,18 +7873,51 @@
               <a:buFont typeface="Arial" panose="020B0604020202020204" pitchFamily="34" charset="0"/>
               <a:buChar char="•"/>
             </a:pPr>
-            <a:endParaRPr lang="en-US">
+            <a:r>
+              <a:rPr lang="en-US" sz="1800" dirty="0" smtClean="0">
+                <a:solidFill>
+                  <a:srgbClr val="000000"/>
+                </a:solidFill>
+              </a:rPr>
+              <a:t>Measured by volume of riders</a:t>
+            </a:r>
+          </a:p>
+          <a:p>
+            <a:pPr marL="800100" lvl="1">
+              <a:buFont typeface="Arial" panose="020B0604020202020204" pitchFamily="34" charset="0"/>
+              <a:buChar char="•"/>
+            </a:pPr>
+            <a:r>
+              <a:rPr lang="en-US" sz="1800" dirty="0" smtClean="0">
+                <a:solidFill>
+                  <a:srgbClr val="000000"/>
+                </a:solidFill>
+              </a:rPr>
+              <a:t>Load bearing on transport system, city grid, etc.</a:t>
+            </a:r>
+            <a:endParaRPr lang="en-US" sz="1800" dirty="0" smtClean="0">
               <a:solidFill>
                 <a:srgbClr val="000000"/>
               </a:solidFill>
             </a:endParaRPr>
           </a:p>
+          <a:p>
+            <a:pPr marL="800100" lvl="1">
+              <a:buFont typeface="Arial" panose="020B0604020202020204" pitchFamily="34" charset="0"/>
+              <a:buChar char="•"/>
+            </a:pPr>
+            <a:endParaRPr lang="en-US" sz="2200" dirty="0">
+              <a:solidFill>
+                <a:srgbClr val="000000"/>
+              </a:solidFill>
+            </a:endParaRPr>
+          </a:p>
         </p:txBody>
       </p:sp>
     </p:spTree>
     <p:extLst>
       <p:ext uri="{BB962C8B-B14F-4D97-AF65-F5344CB8AC3E}">
-        <p14:creationId xmlns:p14="http://schemas.microsoft.com/office/powerpoint/2010/main" val="1610978929"/>
+        <p14:creationId xmlns:p14="http://schemas.microsoft.com/office/powerpoint/2010/main" val="3865177578"/>
       </p:ext>
     </p:extLst>
   </p:cSld>
@@ -7132,7 +7927,7 @@
 </p:sld>
 </file>
 
-<file path=ppt/slides/slide2.xml><?xml version="1.0" encoding="utf-8"?>
+<file path=ppt/slides/slide20.xml><?xml version="1.0" encoding="utf-8"?>
 <p:sld xmlns:a="http://schemas.openxmlformats.org/drawingml/2006/main" xmlns:r="http://schemas.openxmlformats.org/officeDocument/2006/relationships" xmlns:p="http://schemas.openxmlformats.org/presentationml/2006/main">
   <p:cSld>
     <p:bg>
@@ -7348,7 +8143,7 @@
         </p:nvSpPr>
         <p:spPr>
           <a:xfrm>
-            <a:off x="701171" y="1789384"/>
+            <a:off x="692818" y="1773055"/>
             <a:ext cx="11133046" cy="4571998"/>
           </a:xfrm>
           <a:prstGeom prst="rect">
@@ -7579,17 +8374,23 @@
               <a:buSzPct val="25000"/>
             </a:pPr>
             <a:r>
-              <a:rPr lang="en-US" b="1" i="0" u="none" strike="noStrike" kern="1200" cap="none">
+              <a:rPr lang="en-US" b="1" dirty="0" smtClean="0">
                 <a:solidFill>
                   <a:srgbClr val="FFFFFF"/>
                 </a:solidFill>
-                <a:latin typeface="+mj-lt"/>
-                <a:ea typeface="+mj-ea"/>
-                <a:cs typeface="+mj-cs"/>
                 <a:sym typeface="Calibri"/>
               </a:rPr>
-              <a:t>Motivation:</a:t>
-            </a:r>
+              <a:t>Conclusion</a:t>
+            </a:r>
+            <a:endParaRPr lang="en-US" b="1" i="0" u="none" strike="noStrike" kern="1200" cap="none" dirty="0">
+              <a:solidFill>
+                <a:srgbClr val="FFFFFF"/>
+              </a:solidFill>
+              <a:latin typeface="+mj-lt"/>
+              <a:ea typeface="+mj-ea"/>
+              <a:cs typeface="+mj-cs"/>
+              <a:sym typeface="Calibri"/>
+            </a:endParaRPr>
           </a:p>
         </p:txBody>
       </p:sp>
@@ -7603,8 +8404,8 @@
         </p:nvSpPr>
         <p:spPr>
           <a:xfrm>
-            <a:off x="5967811" y="2066211"/>
-            <a:ext cx="5800141" cy="2991888"/>
+            <a:off x="6090574" y="801866"/>
+            <a:ext cx="5306084" cy="5230634"/>
           </a:xfrm>
           <a:prstGeom prst="rect">
             <a:avLst/>
@@ -7612,7 +8413,7 @@
         </p:spPr>
         <p:txBody>
           <a:bodyPr vert="horz" lIns="91440" tIns="45720" rIns="91440" bIns="45720" rtlCol="0" anchor="ctr" anchorCtr="0">
-            <a:normAutofit fontScale="85000" lnSpcReduction="20000"/>
+            <a:normAutofit/>
           </a:bodyPr>
           <a:lstStyle>
             <a:lvl1pPr marL="228600" indent="-228600" algn="l" defTabSz="914400" rtl="0" eaLnBrk="1" latinLnBrk="0" hangingPunct="1">
@@ -7779,181 +8580,64 @@
             </a:lvl9pPr>
           </a:lstStyle>
           <a:p>
-            <a:pPr marL="114300" indent="0">
-              <a:buNone/>
+            <a:pPr marL="342900">
+              <a:buFont typeface="Arial" panose="020B0604020202020204" pitchFamily="34" charset="0"/>
+              <a:buChar char="•"/>
             </a:pPr>
             <a:r>
-              <a:rPr lang="en-US" sz="2200" b="1" dirty="0" smtClean="0">
+              <a:rPr lang="en-US" sz="2400">
                 <a:solidFill>
                   <a:srgbClr val="000000"/>
                 </a:solidFill>
               </a:rPr>
-              <a:t>Individual-level behavior =&gt; Macro Changes</a:t>
-            </a:r>
-          </a:p>
-          <a:p>
-            <a:pPr marL="114300" indent="0">
-              <a:buNone/>
+              <a:t>People in NYC</a:t>
+            </a:r>
+          </a:p>
+          <a:p>
+            <a:pPr marL="342900">
+              <a:buFont typeface="Arial" panose="020B0604020202020204" pitchFamily="34" charset="0"/>
+              <a:buChar char="•"/>
             </a:pPr>
             <a:r>
-              <a:rPr lang="en-US" sz="2200" dirty="0" smtClean="0">
+              <a:rPr lang="en-US" sz="2400">
                 <a:solidFill>
                   <a:srgbClr val="000000"/>
                 </a:solidFill>
               </a:rPr>
-              <a:t>(Individuals Visualized &amp; Temporal Trends)</a:t>
-            </a:r>
-            <a:endParaRPr lang="en-US" sz="2200" b="1" dirty="0">
+              <a:t>Rise of Uber/Lyft/ride-sharing in contrast to old taxi usage</a:t>
+            </a:r>
+          </a:p>
+          <a:p>
+            <a:pPr marL="342900">
+              <a:buFont typeface="Arial" panose="020B0604020202020204" pitchFamily="34" charset="0"/>
+              <a:buChar char="•"/>
+            </a:pPr>
+            <a:r>
+              <a:rPr lang="en-US" sz="2400">
+                <a:solidFill>
+                  <a:srgbClr val="000000"/>
+                </a:solidFill>
+              </a:rPr>
+              <a:t>Traffic in general/environment</a:t>
+            </a:r>
+          </a:p>
+          <a:p>
+            <a:pPr marL="800100" lvl="1">
+              <a:buFont typeface="Arial" panose="020B0604020202020204" pitchFamily="34" charset="0"/>
+              <a:buChar char="•"/>
+            </a:pPr>
+            <a:endParaRPr lang="en-US">
               <a:solidFill>
                 <a:srgbClr val="000000"/>
               </a:solidFill>
             </a:endParaRPr>
           </a:p>
-          <a:p>
-            <a:pPr marL="114300" indent="0">
-              <a:buNone/>
-            </a:pPr>
-            <a:endParaRPr lang="en-US" sz="2200" b="1" dirty="0" smtClean="0">
-              <a:solidFill>
-                <a:srgbClr val="000000"/>
-              </a:solidFill>
-            </a:endParaRPr>
-          </a:p>
-          <a:p>
-            <a:pPr marL="342900">
-              <a:buFont typeface="Arial" panose="020B0604020202020204" pitchFamily="34" charset="0"/>
-              <a:buChar char="•"/>
-            </a:pPr>
-            <a:r>
-              <a:rPr lang="en-US" sz="2200" dirty="0" smtClean="0">
-                <a:solidFill>
-                  <a:srgbClr val="000000"/>
-                </a:solidFill>
-              </a:rPr>
-              <a:t>Phrase-out of government run v. private sector transportation (taxi, subway, </a:t>
-            </a:r>
-            <a:r>
-              <a:rPr lang="en-US" sz="2200" dirty="0" err="1" smtClean="0">
-                <a:solidFill>
-                  <a:srgbClr val="000000"/>
-                </a:solidFill>
-              </a:rPr>
-              <a:t>uber</a:t>
-            </a:r>
-            <a:r>
-              <a:rPr lang="en-US" sz="2200" dirty="0" smtClean="0">
-                <a:solidFill>
-                  <a:srgbClr val="000000"/>
-                </a:solidFill>
-              </a:rPr>
-              <a:t>)</a:t>
-            </a:r>
-          </a:p>
-          <a:p>
-            <a:pPr marL="342900">
-              <a:buFont typeface="Arial" panose="020B0604020202020204" pitchFamily="34" charset="0"/>
-              <a:buChar char="•"/>
-            </a:pPr>
-            <a:r>
-              <a:rPr lang="en-US" sz="2200" dirty="0">
-                <a:solidFill>
-                  <a:srgbClr val="000000"/>
-                </a:solidFill>
-              </a:rPr>
-              <a:t>Adoption of autonomous vehicles </a:t>
-            </a:r>
-            <a:endParaRPr lang="en-US" sz="2200" dirty="0" smtClean="0">
-              <a:solidFill>
-                <a:srgbClr val="000000"/>
-              </a:solidFill>
-            </a:endParaRPr>
-          </a:p>
-          <a:p>
-            <a:pPr marL="800100" lvl="1">
-              <a:buFont typeface="Arial" panose="020B0604020202020204" pitchFamily="34" charset="0"/>
-              <a:buChar char="•"/>
-            </a:pPr>
-            <a:r>
-              <a:rPr lang="en-US" sz="1800" dirty="0" smtClean="0">
-                <a:solidFill>
-                  <a:srgbClr val="000000"/>
-                </a:solidFill>
-              </a:rPr>
-              <a:t>Tech savvy adoption</a:t>
-            </a:r>
-          </a:p>
-          <a:p>
-            <a:pPr marL="342900">
-              <a:buFont typeface="Arial" panose="020B0604020202020204" pitchFamily="34" charset="0"/>
-              <a:buChar char="•"/>
-            </a:pPr>
-            <a:r>
-              <a:rPr lang="en-US" sz="2200" dirty="0">
-                <a:solidFill>
-                  <a:srgbClr val="000000"/>
-                </a:solidFill>
-              </a:rPr>
-              <a:t>G</a:t>
-            </a:r>
-            <a:r>
-              <a:rPr lang="en-US" sz="2200" dirty="0" smtClean="0">
-                <a:solidFill>
-                  <a:srgbClr val="000000"/>
-                </a:solidFill>
-              </a:rPr>
-              <a:t>eneral transportation structures</a:t>
-            </a:r>
-          </a:p>
-          <a:p>
-            <a:pPr marL="800100" lvl="1">
-              <a:buFont typeface="Arial" panose="020B0604020202020204" pitchFamily="34" charset="0"/>
-              <a:buChar char="•"/>
-            </a:pPr>
-            <a:r>
-              <a:rPr lang="en-US" sz="1800" dirty="0" smtClean="0">
-                <a:solidFill>
-                  <a:srgbClr val="000000"/>
-                </a:solidFill>
-              </a:rPr>
-              <a:t>Measured by volume of riders</a:t>
-            </a:r>
-          </a:p>
-          <a:p>
-            <a:pPr marL="800100" lvl="1">
-              <a:buFont typeface="Arial" panose="020B0604020202020204" pitchFamily="34" charset="0"/>
-              <a:buChar char="•"/>
-            </a:pPr>
-            <a:r>
-              <a:rPr lang="en-US" sz="1800" dirty="0" smtClean="0">
-                <a:solidFill>
-                  <a:srgbClr val="000000"/>
-                </a:solidFill>
-              </a:rPr>
-              <a:t>Load bearing on transport system, city grid, etc.</a:t>
-            </a:r>
-            <a:endParaRPr lang="en-US" sz="1800" dirty="0" smtClean="0">
-              <a:solidFill>
-                <a:srgbClr val="000000"/>
-              </a:solidFill>
-            </a:endParaRPr>
-          </a:p>
-          <a:p>
-            <a:pPr marL="800100" lvl="1">
-              <a:buFont typeface="Arial" panose="020B0604020202020204" pitchFamily="34" charset="0"/>
-              <a:buChar char="•"/>
-            </a:pPr>
-            <a:endParaRPr lang="en-US" sz="2200" dirty="0">
-              <a:solidFill>
-                <a:srgbClr val="000000"/>
-              </a:solidFill>
-            </a:endParaRPr>
-          </a:p>
         </p:txBody>
       </p:sp>
     </p:spTree>
     <p:extLst>
       <p:ext uri="{BB962C8B-B14F-4D97-AF65-F5344CB8AC3E}">
-        <p14:creationId xmlns:p14="http://schemas.microsoft.com/office/powerpoint/2010/main" val="3865177578"/>
+        <p14:creationId xmlns:p14="http://schemas.microsoft.com/office/powerpoint/2010/main" val="1610978929"/>
       </p:ext>
     </p:extLst>
   </p:cSld>
@@ -10003,446 +10687,6 @@
 <file path=ppt/slides/slide7.xml><?xml version="1.0" encoding="utf-8"?>
 <p:sld xmlns:a="http://schemas.openxmlformats.org/drawingml/2006/main" xmlns:r="http://schemas.openxmlformats.org/officeDocument/2006/relationships" xmlns:p="http://schemas.openxmlformats.org/presentationml/2006/main">
   <p:cSld>
-    <p:bg>
-      <p:bgPr>
-        <a:solidFill>
-          <a:srgbClr val="FBFBFB"/>
-        </a:solidFill>
-        <a:effectLst/>
-      </p:bgPr>
-    </p:bg>
-    <p:spTree>
-      <p:nvGrpSpPr>
-        <p:cNvPr id="1" name=""/>
-        <p:cNvGrpSpPr/>
-        <p:nvPr/>
-      </p:nvGrpSpPr>
-      <p:grpSpPr>
-        <a:xfrm>
-          <a:off x="0" y="0"/>
-          <a:ext cx="0" cy="0"/>
-          <a:chOff x="0" y="0"/>
-          <a:chExt cx="0" cy="0"/>
-        </a:xfrm>
-      </p:grpSpPr>
-      <p:sp>
-        <p:nvSpPr>
-          <p:cNvPr id="4" name="Shape 249"/>
-          <p:cNvSpPr txBox="1">
-            <a:spLocks noGrp="1"/>
-          </p:cNvSpPr>
-          <p:nvPr>
-            <p:ph type="title"/>
-          </p:nvPr>
-        </p:nvSpPr>
-        <p:spPr>
-          <a:xfrm>
-            <a:off x="628648" y="436192"/>
-            <a:ext cx="11360151" cy="1138238"/>
-          </a:xfrm>
-          <a:prstGeom prst="rect">
-            <a:avLst/>
-          </a:prstGeom>
-          <a:noFill/>
-          <a:ln>
-            <a:noFill/>
-          </a:ln>
-        </p:spPr>
-        <p:txBody>
-          <a:bodyPr lIns="91375" tIns="45675" rIns="91375" bIns="45675" anchor="ctr" anchorCtr="0">
-            <a:noAutofit/>
-          </a:bodyPr>
-          <a:lstStyle/>
-          <a:p>
-            <a:pPr marL="0" marR="0" lvl="0" indent="0" rtl="0">
-              <a:lnSpc>
-                <a:spcPct val="90000"/>
-              </a:lnSpc>
-              <a:spcBef>
-                <a:spcPts val="0"/>
-              </a:spcBef>
-              <a:spcAft>
-                <a:spcPts val="0"/>
-              </a:spcAft>
-              <a:buSzPct val="25000"/>
-              <a:buNone/>
-            </a:pPr>
-            <a:r>
-              <a:rPr lang="en-US" sz="3000" b="1" dirty="0" smtClean="0">
-                <a:solidFill>
-                  <a:schemeClr val="accent5"/>
-                </a:solidFill>
-                <a:latin typeface="Corbel" charset="0"/>
-                <a:ea typeface="Corbel" charset="0"/>
-                <a:cs typeface="Corbel" charset="0"/>
-                <a:sym typeface="Calibri"/>
-              </a:rPr>
-              <a:t>Visualization</a:t>
-            </a:r>
-            <a:endParaRPr lang="en-US" sz="3000" b="1" i="0" u="none" strike="noStrike" cap="none" dirty="0">
-              <a:solidFill>
-                <a:schemeClr val="accent5"/>
-              </a:solidFill>
-              <a:latin typeface="Corbel" charset="0"/>
-              <a:ea typeface="Corbel" charset="0"/>
-              <a:cs typeface="Corbel" charset="0"/>
-              <a:sym typeface="Calibri"/>
-            </a:endParaRPr>
-          </a:p>
-        </p:txBody>
-      </p:sp>
-      <p:sp>
-        <p:nvSpPr>
-          <p:cNvPr id="5" name="Shape 250"/>
-          <p:cNvSpPr txBox="1">
-            <a:spLocks/>
-          </p:cNvSpPr>
-          <p:nvPr/>
-        </p:nvSpPr>
-        <p:spPr>
-          <a:xfrm>
-            <a:off x="628648" y="1213100"/>
-            <a:ext cx="10633517" cy="5384800"/>
-          </a:xfrm>
-          <a:prstGeom prst="rect">
-            <a:avLst/>
-          </a:prstGeom>
-          <a:noFill/>
-          <a:ln>
-            <a:noFill/>
-          </a:ln>
-        </p:spPr>
-        <p:txBody>
-          <a:bodyPr vert="horz" lIns="91375" tIns="45675" rIns="91375" bIns="45675" rtlCol="0" anchor="t" anchorCtr="0">
-            <a:noAutofit/>
-          </a:bodyPr>
-          <a:lstStyle>
-            <a:lvl1pPr marL="228600" indent="-228600" algn="l" defTabSz="914400" rtl="0" eaLnBrk="1" latinLnBrk="0" hangingPunct="1">
-              <a:lnSpc>
-                <a:spcPct val="90000"/>
-              </a:lnSpc>
-              <a:spcBef>
-                <a:spcPts val="1000"/>
-              </a:spcBef>
-              <a:buFont typeface="Arial"/>
-              <a:buChar char="•"/>
-              <a:defRPr sz="2800" kern="1200">
-                <a:solidFill>
-                  <a:schemeClr val="tx1"/>
-                </a:solidFill>
-                <a:latin typeface="+mn-lt"/>
-                <a:ea typeface="+mn-ea"/>
-                <a:cs typeface="+mn-cs"/>
-              </a:defRPr>
-            </a:lvl1pPr>
-            <a:lvl2pPr marL="685800" indent="-228600" algn="l" defTabSz="914400" rtl="0" eaLnBrk="1" latinLnBrk="0" hangingPunct="1">
-              <a:lnSpc>
-                <a:spcPct val="90000"/>
-              </a:lnSpc>
-              <a:spcBef>
-                <a:spcPts val="500"/>
-              </a:spcBef>
-              <a:buFont typeface="Arial"/>
-              <a:buChar char="•"/>
-              <a:defRPr sz="2400" kern="1200">
-                <a:solidFill>
-                  <a:schemeClr val="tx1"/>
-                </a:solidFill>
-                <a:latin typeface="+mn-lt"/>
-                <a:ea typeface="+mn-ea"/>
-                <a:cs typeface="+mn-cs"/>
-              </a:defRPr>
-            </a:lvl2pPr>
-            <a:lvl3pPr marL="1143000" indent="-228600" algn="l" defTabSz="914400" rtl="0" eaLnBrk="1" latinLnBrk="0" hangingPunct="1">
-              <a:lnSpc>
-                <a:spcPct val="90000"/>
-              </a:lnSpc>
-              <a:spcBef>
-                <a:spcPts val="500"/>
-              </a:spcBef>
-              <a:buFont typeface="Arial"/>
-              <a:buChar char="•"/>
-              <a:defRPr sz="2000" kern="1200">
-                <a:solidFill>
-                  <a:schemeClr val="tx1"/>
-                </a:solidFill>
-                <a:latin typeface="+mn-lt"/>
-                <a:ea typeface="+mn-ea"/>
-                <a:cs typeface="+mn-cs"/>
-              </a:defRPr>
-            </a:lvl3pPr>
-            <a:lvl4pPr marL="1600200" indent="-228600" algn="l" defTabSz="914400" rtl="0" eaLnBrk="1" latinLnBrk="0" hangingPunct="1">
-              <a:lnSpc>
-                <a:spcPct val="90000"/>
-              </a:lnSpc>
-              <a:spcBef>
-                <a:spcPts val="500"/>
-              </a:spcBef>
-              <a:buFont typeface="Arial"/>
-              <a:buChar char="•"/>
-              <a:defRPr sz="1800" kern="1200">
-                <a:solidFill>
-                  <a:schemeClr val="tx1"/>
-                </a:solidFill>
-                <a:latin typeface="+mn-lt"/>
-                <a:ea typeface="+mn-ea"/>
-                <a:cs typeface="+mn-cs"/>
-              </a:defRPr>
-            </a:lvl4pPr>
-            <a:lvl5pPr marL="2057400" indent="-228600" algn="l" defTabSz="914400" rtl="0" eaLnBrk="1" latinLnBrk="0" hangingPunct="1">
-              <a:lnSpc>
-                <a:spcPct val="90000"/>
-              </a:lnSpc>
-              <a:spcBef>
-                <a:spcPts val="500"/>
-              </a:spcBef>
-              <a:buFont typeface="Arial"/>
-              <a:buChar char="•"/>
-              <a:defRPr sz="1800" kern="1200">
-                <a:solidFill>
-                  <a:schemeClr val="tx1"/>
-                </a:solidFill>
-                <a:latin typeface="+mn-lt"/>
-                <a:ea typeface="+mn-ea"/>
-                <a:cs typeface="+mn-cs"/>
-              </a:defRPr>
-            </a:lvl5pPr>
-            <a:lvl6pPr marL="2514600" indent="-228600" algn="l" defTabSz="914400" rtl="0" eaLnBrk="1" latinLnBrk="0" hangingPunct="1">
-              <a:lnSpc>
-                <a:spcPct val="90000"/>
-              </a:lnSpc>
-              <a:spcBef>
-                <a:spcPts val="500"/>
-              </a:spcBef>
-              <a:buFont typeface="Arial"/>
-              <a:buChar char="•"/>
-              <a:defRPr sz="1800" kern="1200">
-                <a:solidFill>
-                  <a:schemeClr val="tx1"/>
-                </a:solidFill>
-                <a:latin typeface="+mn-lt"/>
-                <a:ea typeface="+mn-ea"/>
-                <a:cs typeface="+mn-cs"/>
-              </a:defRPr>
-            </a:lvl6pPr>
-            <a:lvl7pPr marL="2971800" indent="-228600" algn="l" defTabSz="914400" rtl="0" eaLnBrk="1" latinLnBrk="0" hangingPunct="1">
-              <a:lnSpc>
-                <a:spcPct val="90000"/>
-              </a:lnSpc>
-              <a:spcBef>
-                <a:spcPts val="500"/>
-              </a:spcBef>
-              <a:buFont typeface="Arial"/>
-              <a:buChar char="•"/>
-              <a:defRPr sz="1800" kern="1200">
-                <a:solidFill>
-                  <a:schemeClr val="tx1"/>
-                </a:solidFill>
-                <a:latin typeface="+mn-lt"/>
-                <a:ea typeface="+mn-ea"/>
-                <a:cs typeface="+mn-cs"/>
-              </a:defRPr>
-            </a:lvl7pPr>
-            <a:lvl8pPr marL="3429000" indent="-228600" algn="l" defTabSz="914400" rtl="0" eaLnBrk="1" latinLnBrk="0" hangingPunct="1">
-              <a:lnSpc>
-                <a:spcPct val="90000"/>
-              </a:lnSpc>
-              <a:spcBef>
-                <a:spcPts val="500"/>
-              </a:spcBef>
-              <a:buFont typeface="Arial"/>
-              <a:buChar char="•"/>
-              <a:defRPr sz="1800" kern="1200">
-                <a:solidFill>
-                  <a:schemeClr val="tx1"/>
-                </a:solidFill>
-                <a:latin typeface="+mn-lt"/>
-                <a:ea typeface="+mn-ea"/>
-                <a:cs typeface="+mn-cs"/>
-              </a:defRPr>
-            </a:lvl8pPr>
-            <a:lvl9pPr marL="3886200" indent="-228600" algn="l" defTabSz="914400" rtl="0" eaLnBrk="1" latinLnBrk="0" hangingPunct="1">
-              <a:lnSpc>
-                <a:spcPct val="90000"/>
-              </a:lnSpc>
-              <a:spcBef>
-                <a:spcPts val="500"/>
-              </a:spcBef>
-              <a:buFont typeface="Arial"/>
-              <a:buChar char="•"/>
-              <a:defRPr sz="1800" kern="1200">
-                <a:solidFill>
-                  <a:schemeClr val="tx1"/>
-                </a:solidFill>
-                <a:latin typeface="+mn-lt"/>
-                <a:ea typeface="+mn-ea"/>
-                <a:cs typeface="+mn-cs"/>
-              </a:defRPr>
-            </a:lvl9pPr>
-          </a:lstStyle>
-          <a:p>
-            <a:pPr marL="342900" indent="-342900"/>
-            <a:r>
-              <a:rPr lang="en-US" dirty="0" smtClean="0">
-                <a:latin typeface="Corbel" charset="0"/>
-                <a:ea typeface="Corbel" charset="0"/>
-                <a:cs typeface="Corbel" charset="0"/>
-              </a:rPr>
-              <a:t>After accounting for key covariates:</a:t>
-            </a:r>
-          </a:p>
-          <a:p>
-            <a:pPr marL="800100" lvl="1" indent="-342900"/>
-            <a:r>
-              <a:rPr lang="en-US" dirty="0" smtClean="0">
-                <a:latin typeface="Corbel" charset="0"/>
-                <a:ea typeface="Corbel" charset="0"/>
-                <a:cs typeface="Corbel" charset="0"/>
-              </a:rPr>
-              <a:t>Non-Hispanic black households held $2,000 less than non-Hispanic white households in net worth at 10</a:t>
-            </a:r>
-            <a:r>
-              <a:rPr lang="en-US" baseline="30000" dirty="0" smtClean="0">
-                <a:latin typeface="Corbel" charset="0"/>
-                <a:ea typeface="Corbel" charset="0"/>
-                <a:cs typeface="Corbel" charset="0"/>
-              </a:rPr>
-              <a:t>th</a:t>
-            </a:r>
-            <a:r>
-              <a:rPr lang="en-US" dirty="0" smtClean="0">
-                <a:latin typeface="Corbel" charset="0"/>
-                <a:ea typeface="Corbel" charset="0"/>
-                <a:cs typeface="Corbel" charset="0"/>
-              </a:rPr>
-              <a:t> percentile</a:t>
-            </a:r>
-          </a:p>
-          <a:p>
-            <a:pPr marL="1257300" lvl="2" indent="-342900"/>
-            <a:r>
-              <a:rPr lang="en-US" dirty="0" smtClean="0">
-                <a:latin typeface="Corbel" charset="0"/>
-                <a:ea typeface="Corbel" charset="0"/>
-                <a:cs typeface="Corbel" charset="0"/>
-              </a:rPr>
-              <a:t>$61,000 less at the median</a:t>
-            </a:r>
-          </a:p>
-          <a:p>
-            <a:pPr marL="1257300" lvl="2" indent="-342900"/>
-            <a:r>
-              <a:rPr lang="en-US" dirty="0" smtClean="0">
-                <a:latin typeface="Corbel" charset="0"/>
-                <a:ea typeface="Corbel" charset="0"/>
-                <a:cs typeface="Corbel" charset="0"/>
-              </a:rPr>
-              <a:t>$194,000 less at the 90th percentile </a:t>
-            </a:r>
-          </a:p>
-          <a:p>
-            <a:pPr marL="800100" lvl="1" indent="-342900"/>
-            <a:r>
-              <a:rPr lang="en-US" dirty="0" smtClean="0">
-                <a:latin typeface="Corbel" charset="0"/>
-                <a:ea typeface="Corbel" charset="0"/>
-                <a:cs typeface="Corbel" charset="0"/>
-              </a:rPr>
-              <a:t>Hispanic households held $2,800 more than non-Hispanic white households in net worth at 10</a:t>
-            </a:r>
-            <a:r>
-              <a:rPr lang="en-US" baseline="30000" dirty="0" smtClean="0">
-                <a:latin typeface="Corbel" charset="0"/>
-                <a:ea typeface="Corbel" charset="0"/>
-                <a:cs typeface="Corbel" charset="0"/>
-              </a:rPr>
-              <a:t>th</a:t>
-            </a:r>
-            <a:r>
-              <a:rPr lang="en-US" dirty="0" smtClean="0">
-                <a:latin typeface="Corbel" charset="0"/>
-                <a:ea typeface="Corbel" charset="0"/>
-                <a:cs typeface="Corbel" charset="0"/>
-              </a:rPr>
-              <a:t> percentile</a:t>
-            </a:r>
-          </a:p>
-          <a:p>
-            <a:pPr marL="1257300" lvl="2" indent="-342900"/>
-            <a:r>
-              <a:rPr lang="en-US" dirty="0" smtClean="0">
-                <a:latin typeface="Corbel" charset="0"/>
-                <a:ea typeface="Corbel" charset="0"/>
-                <a:cs typeface="Corbel" charset="0"/>
-              </a:rPr>
-              <a:t>$45,000 less at the median</a:t>
-            </a:r>
-          </a:p>
-          <a:p>
-            <a:pPr marL="1257300" lvl="2" indent="-342900"/>
-            <a:r>
-              <a:rPr lang="en-US" dirty="0" smtClean="0">
-                <a:latin typeface="Corbel" charset="0"/>
-                <a:ea typeface="Corbel" charset="0"/>
-                <a:cs typeface="Corbel" charset="0"/>
-              </a:rPr>
-              <a:t>Few significant differences at the 90</a:t>
-            </a:r>
-            <a:r>
-              <a:rPr lang="en-US" baseline="30000" dirty="0" smtClean="0">
-                <a:latin typeface="Corbel" charset="0"/>
-                <a:ea typeface="Corbel" charset="0"/>
-                <a:cs typeface="Corbel" charset="0"/>
-              </a:rPr>
-              <a:t>th</a:t>
-            </a:r>
-            <a:r>
-              <a:rPr lang="en-US" dirty="0" smtClean="0">
-                <a:latin typeface="Corbel" charset="0"/>
-                <a:ea typeface="Corbel" charset="0"/>
-                <a:cs typeface="Corbel" charset="0"/>
-              </a:rPr>
-              <a:t> </a:t>
-            </a:r>
-            <a:r>
-              <a:rPr lang="en-US" dirty="0" smtClean="0">
-                <a:latin typeface="Corbel" charset="0"/>
-                <a:ea typeface="Corbel" charset="0"/>
-                <a:cs typeface="Corbel" charset="0"/>
-              </a:rPr>
-              <a:t>percentile</a:t>
-            </a:r>
-            <a:endParaRPr lang="en-US" dirty="0" smtClean="0">
-              <a:latin typeface="Corbel" charset="0"/>
-              <a:ea typeface="Corbel" charset="0"/>
-              <a:cs typeface="Corbel" charset="0"/>
-            </a:endParaRPr>
-          </a:p>
-        </p:txBody>
-      </p:sp>
-    </p:spTree>
-    <p:extLst>
-      <p:ext uri="{BB962C8B-B14F-4D97-AF65-F5344CB8AC3E}">
-        <p14:creationId xmlns:p14="http://schemas.microsoft.com/office/powerpoint/2010/main" val="1598789559"/>
-      </p:ext>
-    </p:extLst>
-  </p:cSld>
-  <p:clrMapOvr>
-    <a:masterClrMapping/>
-  </p:clrMapOvr>
-  <p:timing>
-    <p:tnLst>
-      <p:par>
-        <p:cTn id="1" dur="indefinite" restart="never" nodeType="tmRoot"/>
-      </p:par>
-    </p:tnLst>
-  </p:timing>
-</p:sld>
-</file>
-
-<file path=ppt/slides/slide8.xml><?xml version="1.0" encoding="utf-8"?>
-<p:sld xmlns:a="http://schemas.openxmlformats.org/drawingml/2006/main" xmlns:r="http://schemas.openxmlformats.org/officeDocument/2006/relationships" xmlns:p="http://schemas.openxmlformats.org/presentationml/2006/main">
-  <p:cSld>
     <p:spTree>
       <p:nvGrpSpPr>
         <p:cNvPr id="1" name=""/>
@@ -10507,7 +10751,7 @@
 </p:sld>
 </file>
 
-<file path=ppt/slides/slide9.xml><?xml version="1.0" encoding="utf-8"?>
+<file path=ppt/slides/slide8.xml><?xml version="1.0" encoding="utf-8"?>
 <p:sld xmlns:a="http://schemas.openxmlformats.org/drawingml/2006/main" xmlns:r="http://schemas.openxmlformats.org/officeDocument/2006/relationships" xmlns:p="http://schemas.openxmlformats.org/presentationml/2006/main">
   <p:cSld>
     <p:spTree>
@@ -10624,6 +10868,407 @@
     <p:extLst>
       <p:ext uri="{BB962C8B-B14F-4D97-AF65-F5344CB8AC3E}">
         <p14:creationId xmlns:p14="http://schemas.microsoft.com/office/powerpoint/2010/main" val="1340318445"/>
+      </p:ext>
+    </p:extLst>
+  </p:cSld>
+  <p:clrMapOvr>
+    <a:masterClrMapping/>
+  </p:clrMapOvr>
+  <p:timing>
+    <p:tnLst>
+      <p:par>
+        <p:cTn id="1" dur="indefinite" restart="never" nodeType="tmRoot"/>
+      </p:par>
+    </p:tnLst>
+  </p:timing>
+</p:sld>
+</file>
+
+<file path=ppt/slides/slide9.xml><?xml version="1.0" encoding="utf-8"?>
+<p:sld xmlns:a="http://schemas.openxmlformats.org/drawingml/2006/main" xmlns:r="http://schemas.openxmlformats.org/officeDocument/2006/relationships" xmlns:p="http://schemas.openxmlformats.org/presentationml/2006/main">
+  <p:cSld>
+    <p:spTree>
+      <p:nvGrpSpPr>
+        <p:cNvPr id="1" name=""/>
+        <p:cNvGrpSpPr/>
+        <p:nvPr/>
+      </p:nvGrpSpPr>
+      <p:grpSpPr>
+        <a:xfrm>
+          <a:off x="0" y="0"/>
+          <a:ext cx="0" cy="0"/>
+          <a:chOff x="0" y="0"/>
+          <a:chExt cx="0" cy="0"/>
+        </a:xfrm>
+      </p:grpSpPr>
+      <p:sp>
+        <p:nvSpPr>
+          <p:cNvPr id="4" name="Shape 249"/>
+          <p:cNvSpPr txBox="1">
+            <a:spLocks noGrp="1"/>
+          </p:cNvSpPr>
+          <p:nvPr>
+            <p:ph type="title"/>
+          </p:nvPr>
+        </p:nvSpPr>
+        <p:spPr>
+          <a:xfrm>
+            <a:off x="781048" y="261258"/>
+            <a:ext cx="11360151" cy="1138238"/>
+          </a:xfrm>
+          <a:prstGeom prst="rect">
+            <a:avLst/>
+          </a:prstGeom>
+          <a:noFill/>
+          <a:ln>
+            <a:noFill/>
+          </a:ln>
+        </p:spPr>
+        <p:txBody>
+          <a:bodyPr lIns="91375" tIns="45675" rIns="91375" bIns="45675" anchor="ctr" anchorCtr="0">
+            <a:noAutofit/>
+          </a:bodyPr>
+          <a:lstStyle/>
+          <a:p>
+            <a:pPr marL="0" marR="0" lvl="0" indent="0" rtl="0">
+              <a:lnSpc>
+                <a:spcPct val="90000"/>
+              </a:lnSpc>
+              <a:spcBef>
+                <a:spcPts val="0"/>
+              </a:spcBef>
+              <a:spcAft>
+                <a:spcPts val="0"/>
+              </a:spcAft>
+              <a:buSzPct val="25000"/>
+              <a:buNone/>
+            </a:pPr>
+            <a:r>
+              <a:rPr lang="en-US" sz="3000" b="1" dirty="0" smtClean="0">
+                <a:solidFill>
+                  <a:schemeClr val="accent5"/>
+                </a:solidFill>
+                <a:latin typeface="Corbel" charset="0"/>
+                <a:ea typeface="Corbel" charset="0"/>
+                <a:cs typeface="Corbel" charset="0"/>
+                <a:sym typeface="Calibri"/>
+              </a:rPr>
+              <a:t>Uber Rides Volume over Time of Day (by Day of Week)</a:t>
+            </a:r>
+            <a:endParaRPr lang="en-US" sz="3000" b="1" i="0" u="none" strike="noStrike" cap="none" dirty="0">
+              <a:solidFill>
+                <a:schemeClr val="accent5"/>
+              </a:solidFill>
+              <a:latin typeface="Corbel" charset="0"/>
+              <a:ea typeface="Corbel" charset="0"/>
+              <a:cs typeface="Corbel" charset="0"/>
+              <a:sym typeface="Calibri"/>
+            </a:endParaRPr>
+          </a:p>
+        </p:txBody>
+      </p:sp>
+      <p:pic>
+        <p:nvPicPr>
+          <p:cNvPr id="2" name="Picture 1"/>
+          <p:cNvPicPr>
+            <a:picLocks noChangeAspect="1"/>
+          </p:cNvPicPr>
+          <p:nvPr/>
+        </p:nvPicPr>
+        <p:blipFill>
+          <a:blip r:embed="rId3">
+            <a:extLst>
+              <a:ext uri="{28A0092B-C50C-407E-A947-70E740481C1C}">
+                <a14:useLocalDpi xmlns:a14="http://schemas.microsoft.com/office/drawing/2010/main" val="0"/>
+              </a:ext>
+            </a:extLst>
+          </a:blip>
+          <a:stretch>
+            <a:fillRect/>
+          </a:stretch>
+        </p:blipFill>
+        <p:spPr>
+          <a:xfrm>
+            <a:off x="781048" y="1322688"/>
+            <a:ext cx="10394952" cy="5535312"/>
+          </a:xfrm>
+          <a:prstGeom prst="rect">
+            <a:avLst/>
+          </a:prstGeom>
+        </p:spPr>
+      </p:pic>
+      <p:cxnSp>
+        <p:nvCxnSpPr>
+          <p:cNvPr id="5" name="Straight Arrow Connector 4"/>
+          <p:cNvCxnSpPr/>
+          <p:nvPr/>
+        </p:nvCxnSpPr>
+        <p:spPr>
+          <a:xfrm flipH="1">
+            <a:off x="9470571" y="1828800"/>
+            <a:ext cx="326572" cy="800100"/>
+          </a:xfrm>
+          <a:prstGeom prst="straightConnector1">
+            <a:avLst/>
+          </a:prstGeom>
+          <a:ln w="57150">
+            <a:solidFill>
+              <a:schemeClr val="accent5"/>
+            </a:solidFill>
+            <a:tailEnd type="triangle"/>
+          </a:ln>
+        </p:spPr>
+        <p:style>
+          <a:lnRef idx="1">
+            <a:schemeClr val="accent1"/>
+          </a:lnRef>
+          <a:fillRef idx="0">
+            <a:schemeClr val="accent1"/>
+          </a:fillRef>
+          <a:effectRef idx="0">
+            <a:schemeClr val="accent1"/>
+          </a:effectRef>
+          <a:fontRef idx="minor">
+            <a:schemeClr val="tx1"/>
+          </a:fontRef>
+        </p:style>
+      </p:cxnSp>
+      <p:cxnSp>
+        <p:nvCxnSpPr>
+          <p:cNvPr id="6" name="Straight Arrow Connector 5"/>
+          <p:cNvCxnSpPr/>
+          <p:nvPr/>
+        </p:nvCxnSpPr>
+        <p:spPr>
+          <a:xfrm flipV="1">
+            <a:off x="7560128" y="4789714"/>
+            <a:ext cx="397329" cy="647701"/>
+          </a:xfrm>
+          <a:prstGeom prst="straightConnector1">
+            <a:avLst/>
+          </a:prstGeom>
+          <a:ln w="57150">
+            <a:solidFill>
+              <a:schemeClr val="accent5"/>
+            </a:solidFill>
+            <a:tailEnd type="triangle"/>
+          </a:ln>
+        </p:spPr>
+        <p:style>
+          <a:lnRef idx="1">
+            <a:schemeClr val="accent1"/>
+          </a:lnRef>
+          <a:fillRef idx="0">
+            <a:schemeClr val="accent1"/>
+          </a:fillRef>
+          <a:effectRef idx="0">
+            <a:schemeClr val="accent1"/>
+          </a:effectRef>
+          <a:fontRef idx="minor">
+            <a:schemeClr val="tx1"/>
+          </a:fontRef>
+        </p:style>
+      </p:cxnSp>
+      <p:sp>
+        <p:nvSpPr>
+          <p:cNvPr id="8" name="TextBox 7"/>
+          <p:cNvSpPr txBox="1"/>
+          <p:nvPr/>
+        </p:nvSpPr>
+        <p:spPr>
+          <a:xfrm>
+            <a:off x="6566805" y="5463077"/>
+            <a:ext cx="2318657" cy="369332"/>
+          </a:xfrm>
+          <a:prstGeom prst="rect">
+            <a:avLst/>
+          </a:prstGeom>
+          <a:noFill/>
+        </p:spPr>
+        <p:txBody>
+          <a:bodyPr wrap="square" rtlCol="0">
+            <a:spAutoFit/>
+          </a:bodyPr>
+          <a:lstStyle/>
+          <a:p>
+            <a:r>
+              <a:rPr lang="en-US" b="1" dirty="0" smtClean="0">
+                <a:solidFill>
+                  <a:schemeClr val="accent5"/>
+                </a:solidFill>
+              </a:rPr>
+              <a:t>A diverging weekend</a:t>
+            </a:r>
+            <a:endParaRPr lang="en-US" b="1" dirty="0">
+              <a:solidFill>
+                <a:schemeClr val="accent5"/>
+              </a:solidFill>
+            </a:endParaRPr>
+          </a:p>
+        </p:txBody>
+      </p:sp>
+      <p:cxnSp>
+        <p:nvCxnSpPr>
+          <p:cNvPr id="9" name="Straight Arrow Connector 8"/>
+          <p:cNvCxnSpPr/>
+          <p:nvPr/>
+        </p:nvCxnSpPr>
+        <p:spPr>
+          <a:xfrm flipH="1" flipV="1">
+            <a:off x="4631869" y="5329427"/>
+            <a:ext cx="1867203" cy="301383"/>
+          </a:xfrm>
+          <a:prstGeom prst="straightConnector1">
+            <a:avLst/>
+          </a:prstGeom>
+          <a:ln w="57150">
+            <a:solidFill>
+              <a:schemeClr val="accent5"/>
+            </a:solidFill>
+            <a:tailEnd type="triangle"/>
+          </a:ln>
+        </p:spPr>
+        <p:style>
+          <a:lnRef idx="1">
+            <a:schemeClr val="accent1"/>
+          </a:lnRef>
+          <a:fillRef idx="0">
+            <a:schemeClr val="accent1"/>
+          </a:fillRef>
+          <a:effectRef idx="0">
+            <a:schemeClr val="accent1"/>
+          </a:effectRef>
+          <a:fontRef idx="minor">
+            <a:schemeClr val="tx1"/>
+          </a:fontRef>
+        </p:style>
+      </p:cxnSp>
+      <p:sp>
+        <p:nvSpPr>
+          <p:cNvPr id="12" name="TextBox 11"/>
+          <p:cNvSpPr txBox="1"/>
+          <p:nvPr/>
+        </p:nvSpPr>
+        <p:spPr>
+          <a:xfrm>
+            <a:off x="9145813" y="1159565"/>
+            <a:ext cx="2318657" cy="646331"/>
+          </a:xfrm>
+          <a:prstGeom prst="rect">
+            <a:avLst/>
+          </a:prstGeom>
+          <a:noFill/>
+        </p:spPr>
+        <p:txBody>
+          <a:bodyPr wrap="square" rtlCol="0">
+            <a:spAutoFit/>
+          </a:bodyPr>
+          <a:lstStyle/>
+          <a:p>
+            <a:r>
+              <a:rPr lang="en-US" b="1" dirty="0" smtClean="0">
+                <a:solidFill>
+                  <a:schemeClr val="accent5"/>
+                </a:solidFill>
+              </a:rPr>
+              <a:t>Friday &amp; Saturday:</a:t>
+            </a:r>
+          </a:p>
+          <a:p>
+            <a:r>
+              <a:rPr lang="en-US" b="1" dirty="0" smtClean="0">
+                <a:solidFill>
+                  <a:schemeClr val="accent5"/>
+                </a:solidFill>
+              </a:rPr>
+              <a:t>Going out nights</a:t>
+            </a:r>
+            <a:endParaRPr lang="en-US" b="1" dirty="0">
+              <a:solidFill>
+                <a:schemeClr val="accent5"/>
+              </a:solidFill>
+            </a:endParaRPr>
+          </a:p>
+        </p:txBody>
+      </p:sp>
+      <p:cxnSp>
+        <p:nvCxnSpPr>
+          <p:cNvPr id="13" name="Straight Arrow Connector 12"/>
+          <p:cNvCxnSpPr/>
+          <p:nvPr/>
+        </p:nvCxnSpPr>
+        <p:spPr>
+          <a:xfrm>
+            <a:off x="3166534" y="3049143"/>
+            <a:ext cx="580570" cy="764287"/>
+          </a:xfrm>
+          <a:prstGeom prst="straightConnector1">
+            <a:avLst/>
+          </a:prstGeom>
+          <a:ln w="57150">
+            <a:solidFill>
+              <a:schemeClr val="accent5"/>
+            </a:solidFill>
+            <a:tailEnd type="triangle"/>
+          </a:ln>
+        </p:spPr>
+        <p:style>
+          <a:lnRef idx="1">
+            <a:schemeClr val="accent1"/>
+          </a:lnRef>
+          <a:fillRef idx="0">
+            <a:schemeClr val="accent1"/>
+          </a:fillRef>
+          <a:effectRef idx="0">
+            <a:schemeClr val="accent1"/>
+          </a:effectRef>
+          <a:fontRef idx="minor">
+            <a:schemeClr val="tx1"/>
+          </a:fontRef>
+        </p:style>
+      </p:cxnSp>
+      <p:sp>
+        <p:nvSpPr>
+          <p:cNvPr id="15" name="TextBox 14"/>
+          <p:cNvSpPr txBox="1"/>
+          <p:nvPr/>
+        </p:nvSpPr>
+        <p:spPr>
+          <a:xfrm>
+            <a:off x="2171092" y="2578707"/>
+            <a:ext cx="2816377" cy="369332"/>
+          </a:xfrm>
+          <a:prstGeom prst="rect">
+            <a:avLst/>
+          </a:prstGeom>
+          <a:noFill/>
+        </p:spPr>
+        <p:txBody>
+          <a:bodyPr wrap="square" rtlCol="0">
+            <a:spAutoFit/>
+          </a:bodyPr>
+          <a:lstStyle/>
+          <a:p>
+            <a:r>
+              <a:rPr lang="en-US" b="1" dirty="0" smtClean="0">
+                <a:solidFill>
+                  <a:schemeClr val="accent5"/>
+                </a:solidFill>
+              </a:rPr>
+              <a:t>Work Week Model</a:t>
+            </a:r>
+            <a:endParaRPr lang="en-US" b="1" dirty="0">
+              <a:solidFill>
+                <a:schemeClr val="accent5"/>
+              </a:solidFill>
+            </a:endParaRPr>
+          </a:p>
+        </p:txBody>
+      </p:sp>
+    </p:spTree>
+    <p:extLst>
+      <p:ext uri="{BB962C8B-B14F-4D97-AF65-F5344CB8AC3E}">
+        <p14:creationId xmlns:p14="http://schemas.microsoft.com/office/powerpoint/2010/main" val="1759048606"/>
       </p:ext>
     </p:extLst>
   </p:cSld>

</xml_diff>